<commit_message>
updated number in 2nd slide
</commit_message>
<xml_diff>
--- a/presentations/DOEcheckin_2017-10-04.pptx
+++ b/presentations/DOEcheckin_2017-10-04.pptx
@@ -3440,8 +3440,20 @@
           <a:p>
             <a:pPr lvl="1"/>
             <a:r>
+              <a:rPr lang="en-US" smtClean="0"/>
+              <a:t>1.037 </a:t>
+            </a:r>
+            <a:r>
+              <a:rPr lang="en-US" smtClean="0"/>
+              <a:t>million</a:t>
+            </a:r>
+            <a:r>
+              <a:rPr lang="en-US" smtClean="0"/>
+              <a:t> </a:t>
+            </a:r>
+            <a:r>
               <a:rPr lang="en-US" dirty="0" smtClean="0"/>
-              <a:t>104 k students</a:t>
+              <a:t>students</a:t>
             </a:r>
             <a:endParaRPr lang="en-US" dirty="0"/>
           </a:p>

</xml_diff>